<commit_message>
when are people clicking analysis
</commit_message>
<xml_diff>
--- a/SRM-NIRS-EEG Update 6-14-2024.pptx
+++ b/SRM-NIRS-EEG Update 6-14-2024.pptx
@@ -334,7 +334,7 @@
           <a:p>
             <a:fld id="{2BF372BA-971C-4A5E-AA1C-F0E1B6AF3044}" type="datetimeFigureOut">
               <a:rPr lang="en-US" smtClean="0"/>
-              <a:t>6/13/2024</a:t>
+              <a:t>6/17/2024</a:t>
             </a:fld>
             <a:endParaRPr lang="en-US"/>
           </a:p>
@@ -916,7 +916,7 @@
           <a:p>
             <a:fld id="{AA28AD0C-0D3C-4715-836C-F1E5BCF2BB14}" type="datetimeFigureOut">
               <a:rPr lang="en-US" smtClean="0"/>
-              <a:t>6/13/2024</a:t>
+              <a:t>6/17/2024</a:t>
             </a:fld>
             <a:endParaRPr lang="en-US"/>
           </a:p>
@@ -1114,7 +1114,7 @@
           <a:p>
             <a:fld id="{AA28AD0C-0D3C-4715-836C-F1E5BCF2BB14}" type="datetimeFigureOut">
               <a:rPr lang="en-US" smtClean="0"/>
-              <a:t>6/13/2024</a:t>
+              <a:t>6/17/2024</a:t>
             </a:fld>
             <a:endParaRPr lang="en-US"/>
           </a:p>
@@ -1322,7 +1322,7 @@
           <a:p>
             <a:fld id="{AA28AD0C-0D3C-4715-836C-F1E5BCF2BB14}" type="datetimeFigureOut">
               <a:rPr lang="en-US" smtClean="0"/>
-              <a:t>6/13/2024</a:t>
+              <a:t>6/17/2024</a:t>
             </a:fld>
             <a:endParaRPr lang="en-US"/>
           </a:p>
@@ -1520,7 +1520,7 @@
           <a:p>
             <a:fld id="{AA28AD0C-0D3C-4715-836C-F1E5BCF2BB14}" type="datetimeFigureOut">
               <a:rPr lang="en-US" smtClean="0"/>
-              <a:t>6/13/2024</a:t>
+              <a:t>6/17/2024</a:t>
             </a:fld>
             <a:endParaRPr lang="en-US"/>
           </a:p>
@@ -1795,7 +1795,7 @@
           <a:p>
             <a:fld id="{AA28AD0C-0D3C-4715-836C-F1E5BCF2BB14}" type="datetimeFigureOut">
               <a:rPr lang="en-US" smtClean="0"/>
-              <a:t>6/13/2024</a:t>
+              <a:t>6/17/2024</a:t>
             </a:fld>
             <a:endParaRPr lang="en-US"/>
           </a:p>
@@ -2060,7 +2060,7 @@
           <a:p>
             <a:fld id="{AA28AD0C-0D3C-4715-836C-F1E5BCF2BB14}" type="datetimeFigureOut">
               <a:rPr lang="en-US" smtClean="0"/>
-              <a:t>6/13/2024</a:t>
+              <a:t>6/17/2024</a:t>
             </a:fld>
             <a:endParaRPr lang="en-US"/>
           </a:p>
@@ -2472,7 +2472,7 @@
           <a:p>
             <a:fld id="{AA28AD0C-0D3C-4715-836C-F1E5BCF2BB14}" type="datetimeFigureOut">
               <a:rPr lang="en-US" smtClean="0"/>
-              <a:t>6/13/2024</a:t>
+              <a:t>6/17/2024</a:t>
             </a:fld>
             <a:endParaRPr lang="en-US"/>
           </a:p>
@@ -2613,7 +2613,7 @@
           <a:p>
             <a:fld id="{AA28AD0C-0D3C-4715-836C-F1E5BCF2BB14}" type="datetimeFigureOut">
               <a:rPr lang="en-US" smtClean="0"/>
-              <a:t>6/13/2024</a:t>
+              <a:t>6/17/2024</a:t>
             </a:fld>
             <a:endParaRPr lang="en-US"/>
           </a:p>
@@ -2726,7 +2726,7 @@
           <a:p>
             <a:fld id="{AA28AD0C-0D3C-4715-836C-F1E5BCF2BB14}" type="datetimeFigureOut">
               <a:rPr lang="en-US" smtClean="0"/>
-              <a:t>6/13/2024</a:t>
+              <a:t>6/17/2024</a:t>
             </a:fld>
             <a:endParaRPr lang="en-US"/>
           </a:p>
@@ -3037,7 +3037,7 @@
           <a:p>
             <a:fld id="{AA28AD0C-0D3C-4715-836C-F1E5BCF2BB14}" type="datetimeFigureOut">
               <a:rPr lang="en-US" smtClean="0"/>
-              <a:t>6/13/2024</a:t>
+              <a:t>6/17/2024</a:t>
             </a:fld>
             <a:endParaRPr lang="en-US"/>
           </a:p>
@@ -3325,7 +3325,7 @@
           <a:p>
             <a:fld id="{AA28AD0C-0D3C-4715-836C-F1E5BCF2BB14}" type="datetimeFigureOut">
               <a:rPr lang="en-US" smtClean="0"/>
-              <a:t>6/13/2024</a:t>
+              <a:t>6/17/2024</a:t>
             </a:fld>
             <a:endParaRPr lang="en-US"/>
           </a:p>
@@ -3566,7 +3566,7 @@
           <a:p>
             <a:fld id="{AA28AD0C-0D3C-4715-836C-F1E5BCF2BB14}" type="datetimeFigureOut">
               <a:rPr lang="en-US" smtClean="0"/>
-              <a:t>6/13/2024</a:t>
+              <a:t>6/17/2024</a:t>
             </a:fld>
             <a:endParaRPr lang="en-US"/>
           </a:p>

</xml_diff>